<commit_message>
add paper formula version
</commit_message>
<xml_diff>
--- a/Grabcut Report.pptx
+++ b/Grabcut Report.pptx
@@ -225,7 +225,7 @@
           <a:p>
             <a:fld id="{ECE420DB-0B9F-462E-B236-6385112CC948}" type="datetimeFigureOut">
               <a:rPr lang="en-US" smtClean="0"/>
-              <a:t>5/27/2020</a:t>
+              <a:t>5/28/2020</a:t>
             </a:fld>
             <a:endParaRPr lang="en-US"/>
           </a:p>
@@ -402,7 +402,7 @@
           <a:p>
             <a:fld id="{44EF8DD1-A57C-4A93-91B3-F1BB2B7FAC7D}" type="datetimeFigureOut">
               <a:rPr lang="en-US" smtClean="0"/>
-              <a:t>5/27/2020</a:t>
+              <a:t>5/28/2020</a:t>
             </a:fld>
             <a:endParaRPr lang="en-US"/>
           </a:p>
@@ -2274,8 +2274,8 @@
           </a:p>
         </p:txBody>
       </p:sp>
-      <mc:AlternateContent xmlns:mc="http://schemas.openxmlformats.org/markup-compatibility/2006" xmlns:a14="http://schemas.microsoft.com/office/drawing/2010/main">
-        <mc:Choice Requires="a14">
+      <mc:AlternateContent xmlns:mc="http://schemas.openxmlformats.org/markup-compatibility/2006">
+        <mc:Choice xmlns:a14="http://schemas.microsoft.com/office/drawing/2010/main" Requires="a14">
           <p:sp>
             <p:nvSpPr>
               <p:cNvPr id="3" name="Content Placeholder 2">
@@ -2721,6 +2721,9 @@
                 <a:endParaRPr lang="en-US" b="0" dirty="0"/>
               </a:p>
               <a:p>
+                <a:endParaRPr lang="en-US" dirty="0"/>
+              </a:p>
+              <a:p>
                 <a:r>
                   <a:rPr lang="en-US" dirty="0"/>
                   <a:t>T-links: edges connect from BGD source to pixels and from pixels to FGD source, define color fit term </a:t>
@@ -2795,7 +2798,7 @@
             </p:txBody>
           </p:sp>
         </mc:Choice>
-        <mc:Fallback xmlns="">
+        <mc:Fallback>
           <p:sp>
             <p:nvSpPr>
               <p:cNvPr id="3" name="Content Placeholder 2">
@@ -2835,8 +2838,8 @@
           </p:sp>
         </mc:Fallback>
       </mc:AlternateContent>
-      <mc:AlternateContent xmlns:mc="http://schemas.openxmlformats.org/markup-compatibility/2006" xmlns:a14="http://schemas.microsoft.com/office/drawing/2010/main">
-        <mc:Choice Requires="a14">
+      <mc:AlternateContent xmlns:mc="http://schemas.openxmlformats.org/markup-compatibility/2006">
+        <mc:Choice xmlns:a14="http://schemas.microsoft.com/office/drawing/2010/main" Requires="a14">
           <p:graphicFrame>
             <p:nvGraphicFramePr>
               <p:cNvPr id="6" name="Table 6">
@@ -2852,13 +2855,13 @@
               <p:nvPr>
                 <p:extLst>
                   <p:ext uri="{D42A27DB-BD31-4B8C-83A1-F6EECF244321}">
-                    <p14:modId xmlns:p14="http://schemas.microsoft.com/office/powerpoint/2010/main" val="2133888405"/>
+                    <p14:modId xmlns:p14="http://schemas.microsoft.com/office/powerpoint/2010/main" val="768849288"/>
                   </p:ext>
                 </p:extLst>
               </p:nvPr>
             </p:nvGraphicFramePr>
             <p:xfrm>
-              <a:off x="1729317" y="3584891"/>
+              <a:off x="1729317" y="3976562"/>
               <a:ext cx="8127999" cy="1478280"/>
             </p:xfrm>
             <a:graphic>
@@ -3858,7 +3861,7 @@
             </a:graphic>
           </p:graphicFrame>
         </mc:Choice>
-        <mc:Fallback xmlns="">
+        <mc:Fallback>
           <p:graphicFrame>
             <p:nvGraphicFramePr>
               <p:cNvPr id="6" name="Table 6">
@@ -3874,13 +3877,13 @@
               <p:nvPr>
                 <p:extLst>
                   <p:ext uri="{D42A27DB-BD31-4B8C-83A1-F6EECF244321}">
-                    <p14:modId xmlns:p14="http://schemas.microsoft.com/office/powerpoint/2010/main" val="2133888405"/>
+                    <p14:modId xmlns:p14="http://schemas.microsoft.com/office/powerpoint/2010/main" val="768849288"/>
                   </p:ext>
                 </p:extLst>
               </p:nvPr>
             </p:nvGraphicFramePr>
             <p:xfrm>
-              <a:off x="1729317" y="3584891"/>
+              <a:off x="1729317" y="3976562"/>
               <a:ext cx="8127999" cy="1478280"/>
             </p:xfrm>
             <a:graphic>
@@ -4584,6 +4587,66 @@
           </p:graphicFrame>
         </mc:Fallback>
       </mc:AlternateContent>
+      <p:pic>
+        <p:nvPicPr>
+          <p:cNvPr id="5" name="Picture 4">
+            <a:extLst>
+              <a:ext uri="{FF2B5EF4-FFF2-40B4-BE49-F238E27FC236}">
+                <a16:creationId xmlns:a16="http://schemas.microsoft.com/office/drawing/2014/main" id="{1FFA7F79-A456-4218-BA09-CE316EB98E91}"/>
+              </a:ext>
+            </a:extLst>
+          </p:cNvPr>
+          <p:cNvPicPr>
+            <a:picLocks noChangeAspect="1"/>
+          </p:cNvPicPr>
+          <p:nvPr/>
+        </p:nvPicPr>
+        <p:blipFill>
+          <a:blip r:embed="rId5"/>
+          <a:stretch>
+            <a:fillRect/>
+          </a:stretch>
+        </p:blipFill>
+        <p:spPr>
+          <a:xfrm>
+            <a:off x="5911466" y="2320324"/>
+            <a:ext cx="5330536" cy="670777"/>
+          </a:xfrm>
+          <a:prstGeom prst="rect">
+            <a:avLst/>
+          </a:prstGeom>
+        </p:spPr>
+      </p:pic>
+      <p:pic>
+        <p:nvPicPr>
+          <p:cNvPr id="7" name="Picture 6">
+            <a:extLst>
+              <a:ext uri="{FF2B5EF4-FFF2-40B4-BE49-F238E27FC236}">
+                <a16:creationId xmlns:a16="http://schemas.microsoft.com/office/drawing/2014/main" id="{011F6ABD-78E9-4CB0-BB6C-874C1AC911AC}"/>
+              </a:ext>
+            </a:extLst>
+          </p:cNvPr>
+          <p:cNvPicPr>
+            <a:picLocks noChangeAspect="1"/>
+          </p:cNvPicPr>
+          <p:nvPr/>
+        </p:nvPicPr>
+        <p:blipFill>
+          <a:blip r:embed="rId6"/>
+          <a:stretch>
+            <a:fillRect/>
+          </a:stretch>
+        </p:blipFill>
+        <p:spPr>
+          <a:xfrm>
+            <a:off x="6096000" y="1760896"/>
+            <a:ext cx="5330536" cy="594729"/>
+          </a:xfrm>
+          <a:prstGeom prst="rect">
+            <a:avLst/>
+          </a:prstGeom>
+        </p:spPr>
+      </p:pic>
     </p:spTree>
     <p:extLst>
       <p:ext uri="{BB962C8B-B14F-4D97-AF65-F5344CB8AC3E}">
@@ -4881,15 +4944,28 @@
             <a:pPr lvl="1"/>
             <a:r>
               <a:rPr lang="en-US" altLang="zh-CN" dirty="0"/>
-              <a:t>Easy to write, hard to debug</a:t>
+              <a:t>Easy to write, hard to debug: </a:t>
+            </a:r>
+            <a:r>
+              <a:rPr lang="en-US" altLang="zh-CN" dirty="0" err="1"/>
+              <a:t>np.mean</a:t>
+            </a:r>
+            <a:r>
+              <a:rPr lang="en-US" altLang="zh-CN" dirty="0"/>
+              <a:t>(a)</a:t>
             </a:r>
           </a:p>
           <a:p>
             <a:pPr lvl="1"/>
             <a:r>
               <a:rPr lang="en-US" altLang="zh-CN" dirty="0"/>
-              <a:t>Slow performance!</a:t>
-            </a:r>
+              <a:t>Slow performance! </a:t>
+            </a:r>
+            <a:r>
+              <a:rPr lang="en-US" altLang="zh-CN"/>
+              <a:t>30s/iteration</a:t>
+            </a:r>
+            <a:endParaRPr lang="en-US" altLang="zh-CN" dirty="0"/>
           </a:p>
           <a:p>
             <a:r>
@@ -4921,15 +4997,7 @@
             <a:pPr lvl="1"/>
             <a:r>
               <a:rPr lang="zh-CN" altLang="en-US" dirty="0"/>
-              <a:t>写起来</a:t>
-            </a:r>
-            <a:r>
-              <a:rPr lang="zh-CN" altLang="en-US"/>
-              <a:t>比较麻烦，</a:t>
-            </a:r>
-            <a:r>
-              <a:rPr lang="zh-CN" altLang="en-US" dirty="0"/>
-              <a:t>但是能掌握自己的代码运行过程，便于</a:t>
+              <a:t>写起来比较麻烦，但是能掌握自己的代码运行过程，便于</a:t>
             </a:r>
             <a:r>
               <a:rPr lang="en-US" altLang="zh-CN" dirty="0"/>
@@ -4966,6 +5034,36 @@
           </a:p>
         </p:txBody>
       </p:sp>
+      <p:pic>
+        <p:nvPicPr>
+          <p:cNvPr id="5" name="Picture 4">
+            <a:extLst>
+              <a:ext uri="{FF2B5EF4-FFF2-40B4-BE49-F238E27FC236}">
+                <a16:creationId xmlns:a16="http://schemas.microsoft.com/office/drawing/2014/main" id="{40A0B527-6556-4C38-BDE1-F23B2FCB808A}"/>
+              </a:ext>
+            </a:extLst>
+          </p:cNvPr>
+          <p:cNvPicPr>
+            <a:picLocks noChangeAspect="1"/>
+          </p:cNvPicPr>
+          <p:nvPr/>
+        </p:nvPicPr>
+        <p:blipFill>
+          <a:blip r:embed="rId2"/>
+          <a:stretch>
+            <a:fillRect/>
+          </a:stretch>
+        </p:blipFill>
+        <p:spPr>
+          <a:xfrm>
+            <a:off x="8406505" y="2615878"/>
+            <a:ext cx="3429479" cy="2267266"/>
+          </a:xfrm>
+          <a:prstGeom prst="rect">
+            <a:avLst/>
+          </a:prstGeom>
+        </p:spPr>
+      </p:pic>
     </p:spTree>
     <p:extLst>
       <p:ext uri="{BB962C8B-B14F-4D97-AF65-F5344CB8AC3E}">

</xml_diff>